<commit_message>
fixed add slide not copy relationships
</commit_message>
<xml_diff>
--- a/example/templates/template4.pptx
+++ b/example/templates/template4.pptx
@@ -104,6 +104,11 @@
       </a:defRPr>
     </a:lvl9pPr>
   </p:defaultTextStyle>
+  <p:extLst>
+    <p:ext uri="{EFAFB233-063F-42B5-8137-9DF3F51BA10A}">
+      <p15:sldGuideLst xmlns:p15="http://schemas.microsoft.com/office/powerpoint/2012/main"/>
+    </p:ext>
+  </p:extLst>
 </p:presentation>
 </file>
 
@@ -137,7 +142,7 @@
             <a:spLocks noGrp="1"/>
           </p:cNvSpPr>
           <p:nvPr>
-            <p:ph type="ctrTitle"/>
+            <p:ph type="ctrTitle" hasCustomPrompt="1"/>
           </p:nvPr>
         </p:nvSpPr>
         <p:spPr>
@@ -155,9 +160,22 @@
           </a:lstStyle>
           <a:p>
             <a:r>
-              <a:rPr kumimoji="1" lang="zh-CN" altLang="en-US"/>
-              <a:t>单击此处编辑母版标题样式</a:t>
-            </a:r>
+              <a:rPr lang="en" altLang="zh-CN" b="0" dirty="0" err="1">
+                <a:solidFill>
+                  <a:srgbClr val="A31515"/>
+                </a:solidFill>
+                <a:effectLst/>
+                <a:latin typeface="Menlo" panose="020B0609030804020204" pitchFamily="49" charset="0"/>
+              </a:rPr>
+              <a:t>maintitle</a:t>
+            </a:r>
+            <a:endParaRPr lang="en" altLang="zh-CN" b="0" dirty="0">
+              <a:solidFill>
+                <a:srgbClr val="000000"/>
+              </a:solidFill>
+              <a:effectLst/>
+              <a:latin typeface="Menlo" panose="020B0609030804020204" pitchFamily="49" charset="0"/>
+            </a:endParaRPr>
           </a:p>
         </p:txBody>
       </p:sp>
@@ -254,7 +272,7 @@
           <a:p>
             <a:fld id="{B8DF90D8-9D3C-744E-8878-2630CB35DED1}" type="datetimeFigureOut">
               <a:rPr kumimoji="1" lang="zh-CN" altLang="en-US" smtClean="0"/>
-              <a:t>2024/12/16</a:t>
+              <a:t>2024/12/18</a:t>
             </a:fld>
             <a:endParaRPr kumimoji="1" lang="zh-CN" altLang="en-US"/>
           </a:p>
@@ -314,6 +332,36 @@
           </a:p>
         </p:txBody>
       </p:sp>
+      <p:pic>
+        <p:nvPicPr>
+          <p:cNvPr id="8" name="图片 7">
+            <a:extLst>
+              <a:ext uri="{FF2B5EF4-FFF2-40B4-BE49-F238E27FC236}">
+                <a16:creationId xmlns:a16="http://schemas.microsoft.com/office/drawing/2014/main" id="{4EB83E15-CD51-01A9-A130-9D2CE848372E}"/>
+              </a:ext>
+            </a:extLst>
+          </p:cNvPr>
+          <p:cNvPicPr>
+            <a:picLocks noChangeAspect="1"/>
+          </p:cNvPicPr>
+          <p:nvPr userDrawn="1"/>
+        </p:nvPicPr>
+        <p:blipFill>
+          <a:blip r:embed="rId2"/>
+          <a:stretch>
+            <a:fillRect/>
+          </a:stretch>
+        </p:blipFill>
+        <p:spPr>
+          <a:xfrm>
+            <a:off x="0" y="0"/>
+            <a:ext cx="726958" cy="726958"/>
+          </a:xfrm>
+          <a:prstGeom prst="rect">
+            <a:avLst/>
+          </a:prstGeom>
+        </p:spPr>
+      </p:pic>
     </p:spTree>
     <p:extLst>
       <p:ext uri="{BB962C8B-B14F-4D97-AF65-F5344CB8AC3E}">
@@ -452,7 +500,7 @@
           <a:p>
             <a:fld id="{B8DF90D8-9D3C-744E-8878-2630CB35DED1}" type="datetimeFigureOut">
               <a:rPr kumimoji="1" lang="zh-CN" altLang="en-US" smtClean="0"/>
-              <a:t>2024/12/16</a:t>
+              <a:t>2024/12/18</a:t>
             </a:fld>
             <a:endParaRPr kumimoji="1" lang="zh-CN" altLang="en-US"/>
           </a:p>
@@ -660,7 +708,7 @@
           <a:p>
             <a:fld id="{B8DF90D8-9D3C-744E-8878-2630CB35DED1}" type="datetimeFigureOut">
               <a:rPr kumimoji="1" lang="zh-CN" altLang="en-US" smtClean="0"/>
-              <a:t>2024/12/16</a:t>
+              <a:t>2024/12/18</a:t>
             </a:fld>
             <a:endParaRPr kumimoji="1" lang="zh-CN" altLang="en-US"/>
           </a:p>
@@ -858,7 +906,7 @@
           <a:p>
             <a:fld id="{B8DF90D8-9D3C-744E-8878-2630CB35DED1}" type="datetimeFigureOut">
               <a:rPr kumimoji="1" lang="zh-CN" altLang="en-US" smtClean="0"/>
-              <a:t>2024/12/16</a:t>
+              <a:t>2024/12/18</a:t>
             </a:fld>
             <a:endParaRPr kumimoji="1" lang="zh-CN" altLang="en-US"/>
           </a:p>
@@ -1133,7 +1181,7 @@
           <a:p>
             <a:fld id="{B8DF90D8-9D3C-744E-8878-2630CB35DED1}" type="datetimeFigureOut">
               <a:rPr kumimoji="1" lang="zh-CN" altLang="en-US" smtClean="0"/>
-              <a:t>2024/12/16</a:t>
+              <a:t>2024/12/18</a:t>
             </a:fld>
             <a:endParaRPr kumimoji="1" lang="zh-CN" altLang="en-US"/>
           </a:p>
@@ -1398,7 +1446,7 @@
           <a:p>
             <a:fld id="{B8DF90D8-9D3C-744E-8878-2630CB35DED1}" type="datetimeFigureOut">
               <a:rPr kumimoji="1" lang="zh-CN" altLang="en-US" smtClean="0"/>
-              <a:t>2024/12/16</a:t>
+              <a:t>2024/12/18</a:t>
             </a:fld>
             <a:endParaRPr kumimoji="1" lang="zh-CN" altLang="en-US"/>
           </a:p>
@@ -1810,7 +1858,7 @@
           <a:p>
             <a:fld id="{B8DF90D8-9D3C-744E-8878-2630CB35DED1}" type="datetimeFigureOut">
               <a:rPr kumimoji="1" lang="zh-CN" altLang="en-US" smtClean="0"/>
-              <a:t>2024/12/16</a:t>
+              <a:t>2024/12/18</a:t>
             </a:fld>
             <a:endParaRPr kumimoji="1" lang="zh-CN" altLang="en-US"/>
           </a:p>
@@ -1951,7 +1999,7 @@
           <a:p>
             <a:fld id="{B8DF90D8-9D3C-744E-8878-2630CB35DED1}" type="datetimeFigureOut">
               <a:rPr kumimoji="1" lang="zh-CN" altLang="en-US" smtClean="0"/>
-              <a:t>2024/12/16</a:t>
+              <a:t>2024/12/18</a:t>
             </a:fld>
             <a:endParaRPr kumimoji="1" lang="zh-CN" altLang="en-US"/>
           </a:p>
@@ -2064,7 +2112,7 @@
           <a:p>
             <a:fld id="{B8DF90D8-9D3C-744E-8878-2630CB35DED1}" type="datetimeFigureOut">
               <a:rPr kumimoji="1" lang="zh-CN" altLang="en-US" smtClean="0"/>
-              <a:t>2024/12/16</a:t>
+              <a:t>2024/12/18</a:t>
             </a:fld>
             <a:endParaRPr kumimoji="1" lang="zh-CN" altLang="en-US"/>
           </a:p>
@@ -2375,7 +2423,7 @@
           <a:p>
             <a:fld id="{B8DF90D8-9D3C-744E-8878-2630CB35DED1}" type="datetimeFigureOut">
               <a:rPr kumimoji="1" lang="zh-CN" altLang="en-US" smtClean="0"/>
-              <a:t>2024/12/16</a:t>
+              <a:t>2024/12/18</a:t>
             </a:fld>
             <a:endParaRPr kumimoji="1" lang="zh-CN" altLang="en-US"/>
           </a:p>
@@ -2663,7 +2711,7 @@
           <a:p>
             <a:fld id="{B8DF90D8-9D3C-744E-8878-2630CB35DED1}" type="datetimeFigureOut">
               <a:rPr kumimoji="1" lang="zh-CN" altLang="en-US" smtClean="0"/>
-              <a:t>2024/12/16</a:t>
+              <a:t>2024/12/18</a:t>
             </a:fld>
             <a:endParaRPr kumimoji="1" lang="zh-CN" altLang="en-US"/>
           </a:p>
@@ -2904,7 +2952,7 @@
           <a:p>
             <a:fld id="{B8DF90D8-9D3C-744E-8878-2630CB35DED1}" type="datetimeFigureOut">
               <a:rPr kumimoji="1" lang="zh-CN" altLang="en-US" smtClean="0"/>
-              <a:t>2024/12/16</a:t>
+              <a:t>2024/12/18</a:t>
             </a:fld>
             <a:endParaRPr kumimoji="1" lang="zh-CN" altLang="en-US"/>
           </a:p>

</xml_diff>